<commit_message>
Fix: corrigiendo errores de redacción
</commit_message>
<xml_diff>
--- a/6. Presentación Proyecto/Sustentación Trimestre 1 Proyecto Legajo.pptx
+++ b/6. Presentación Proyecto/Sustentación Trimestre 1 Proyecto Legajo.pptx
@@ -17748,7 +17748,7 @@
             <a:tbl>
               <a:tblPr>
                 <a:noFill/>
-                <a:tableStyleId>{32C1FA1D-EECC-418F-B7D3-BC0D1088E8B2}</a:tableStyleId>
+                <a:tableStyleId>{1136963C-93FD-44CD-9440-D0677881BE74}</a:tableStyleId>
               </a:tblPr>
               <a:tblGrid>
                 <a:gridCol w="952500"/>
@@ -19703,7 +19703,7 @@
             <a:tbl>
               <a:tblPr>
                 <a:noFill/>
-                <a:tableStyleId>{32C1FA1D-EECC-418F-B7D3-BC0D1088E8B2}</a:tableStyleId>
+                <a:tableStyleId>{1136963C-93FD-44CD-9440-D0677881BE74}</a:tableStyleId>
               </a:tblPr>
               <a:tblGrid>
                 <a:gridCol w="952500"/>
@@ -21514,7 +21514,7 @@
             <a:tbl>
               <a:tblPr>
                 <a:noFill/>
-                <a:tableStyleId>{32C1FA1D-EECC-418F-B7D3-BC0D1088E8B2}</a:tableStyleId>
+                <a:tableStyleId>{1136963C-93FD-44CD-9440-D0677881BE74}</a:tableStyleId>
               </a:tblPr>
               <a:tblGrid>
                 <a:gridCol w="1078825"/>
@@ -26022,31 +26022,7 @@
                 <a:cs typeface="Calibri"/>
                 <a:sym typeface="Calibri"/>
               </a:rPr>
-              <a:t>Desarrollar una </a:t>
-            </a:r>
-            <a:r>
-              <a:rPr lang="es-CO" sz="2800">
-                <a:solidFill>
-                  <a:schemeClr val="dk1"/>
-                </a:solidFill>
-                <a:latin typeface="Calibri"/>
-                <a:ea typeface="Calibri"/>
-                <a:cs typeface="Calibri"/>
-                <a:sym typeface="Calibri"/>
-              </a:rPr>
-              <a:t>página</a:t>
-            </a:r>
-            <a:r>
-              <a:rPr lang="es-CO" sz="2800">
-                <a:solidFill>
-                  <a:schemeClr val="dk1"/>
-                </a:solidFill>
-                <a:latin typeface="Calibri"/>
-                <a:ea typeface="Calibri"/>
-                <a:cs typeface="Calibri"/>
-                <a:sym typeface="Calibri"/>
-              </a:rPr>
-              <a:t> web que facilite la transmisión de información sobre datos relevantes de una biblioteca, ya sean eventos, clubs de lectura e incluso la disponibilidad del material.</a:t>
+              <a:t>Desarrollar un sistema de información que facilite la transmisión de información sobre datos relevantes de una biblioteca, ya sean eventos, clubs de lectura e incluso la disponibilidad del material.</a:t>
             </a:r>
             <a:endParaRPr sz="2800">
               <a:solidFill>
@@ -26549,7 +26525,7 @@
                   <a:cs typeface="Roboto"/>
                   <a:sym typeface="Roboto"/>
                 </a:rPr>
-                <a:t>Organizar el material de la biblioteca dentro de la </a:t>
+                <a:t>Organizar el material de la biblioteca dentro del sistema</a:t>
               </a:r>
               <a:r>
                 <a:rPr lang="es-CO" sz="1600">
@@ -26561,7 +26537,7 @@
                   <a:cs typeface="Roboto"/>
                   <a:sym typeface="Roboto"/>
                 </a:rPr>
-                <a:t>página,</a:t>
+                <a:t>,</a:t>
               </a:r>
               <a:r>
                 <a:rPr lang="es-CO" sz="1600">
@@ -26597,7 +26573,7 @@
                   <a:cs typeface="Roboto"/>
                   <a:sym typeface="Roboto"/>
                 </a:rPr>
-                <a:t> uso de etiquetas para que sea </a:t>
+                <a:t> uso de categorías para que sea </a:t>
               </a:r>
               <a:r>
                 <a:rPr lang="es-CO" sz="1600">

</xml_diff>

<commit_message>
Fix: Se corrige errores en los archivos
</commit_message>
<xml_diff>
--- a/6. Presentación Proyecto/Sustentación Trimestre 1 Proyecto Legajo.pptx
+++ b/6. Presentación Proyecto/Sustentación Trimestre 1 Proyecto Legajo.pptx
@@ -17748,7 +17748,7 @@
             <a:tbl>
               <a:tblPr>
                 <a:noFill/>
-                <a:tableStyleId>{1136963C-93FD-44CD-9440-D0677881BE74}</a:tableStyleId>
+                <a:tableStyleId>{D753DD68-7685-4FA7-8D74-CE718F00DFCE}</a:tableStyleId>
               </a:tblPr>
               <a:tblGrid>
                 <a:gridCol w="952500"/>
@@ -18906,7 +18906,25 @@
                           <a:cs typeface="Calibri"/>
                           <a:sym typeface="Calibri"/>
                         </a:rPr>
-                        <a:t>El sistema permite que el administrador tenga las herremientas para poder editar un evento nuevo</a:t>
+                        <a:t>El sistema permite que el administrador tenga las </a:t>
+                      </a:r>
+                      <a:r>
+                        <a:rPr lang="es-CO" sz="1100">
+                          <a:latin typeface="Calibri"/>
+                          <a:ea typeface="Calibri"/>
+                          <a:cs typeface="Calibri"/>
+                          <a:sym typeface="Calibri"/>
+                        </a:rPr>
+                        <a:t>herramientas</a:t>
+                      </a:r>
+                      <a:r>
+                        <a:rPr lang="es-CO" sz="1100">
+                          <a:latin typeface="Calibri"/>
+                          <a:ea typeface="Calibri"/>
+                          <a:cs typeface="Calibri"/>
+                          <a:sym typeface="Calibri"/>
+                        </a:rPr>
+                        <a:t> para poder editar un evento nuevo</a:t>
                       </a:r>
                       <a:endParaRPr sz="1100">
                         <a:latin typeface="Calibri"/>
@@ -18982,7 +19000,25 @@
                           <a:cs typeface="Calibri"/>
                           <a:sym typeface="Calibri"/>
                         </a:rPr>
-                        <a:t>El administrador esta editando un evento</a:t>
+                        <a:t>El administrador </a:t>
+                      </a:r>
+                      <a:r>
+                        <a:rPr lang="es-CO" sz="1100">
+                          <a:latin typeface="Calibri"/>
+                          <a:ea typeface="Calibri"/>
+                          <a:cs typeface="Calibri"/>
+                          <a:sym typeface="Calibri"/>
+                        </a:rPr>
+                        <a:t>está</a:t>
+                      </a:r>
+                      <a:r>
+                        <a:rPr lang="es-CO" sz="1100">
+                          <a:latin typeface="Calibri"/>
+                          <a:ea typeface="Calibri"/>
+                          <a:cs typeface="Calibri"/>
+                          <a:sym typeface="Calibri"/>
+                        </a:rPr>
+                        <a:t> editando un evento</a:t>
                       </a:r>
                       <a:endParaRPr sz="1100">
                         <a:latin typeface="Calibri"/>
@@ -19058,7 +19094,25 @@
                           <a:cs typeface="Calibri"/>
                           <a:sym typeface="Calibri"/>
                         </a:rPr>
-                        <a:t>El administrador esta editando un evento nuevo</a:t>
+                        <a:t>El administrador </a:t>
+                      </a:r>
+                      <a:r>
+                        <a:rPr lang="es-CO" sz="1100">
+                          <a:latin typeface="Calibri"/>
+                          <a:ea typeface="Calibri"/>
+                          <a:cs typeface="Calibri"/>
+                          <a:sym typeface="Calibri"/>
+                        </a:rPr>
+                        <a:t>está</a:t>
+                      </a:r>
+                      <a:r>
+                        <a:rPr lang="es-CO" sz="1100">
+                          <a:latin typeface="Calibri"/>
+                          <a:ea typeface="Calibri"/>
+                          <a:cs typeface="Calibri"/>
+                          <a:sym typeface="Calibri"/>
+                        </a:rPr>
+                        <a:t> editando un evento nuevo</a:t>
                       </a:r>
                       <a:endParaRPr sz="1100">
                         <a:latin typeface="Calibri"/>
@@ -19292,7 +19346,25 @@
                           <a:cs typeface="Calibri"/>
                           <a:sym typeface="Calibri"/>
                         </a:rPr>
-                        <a:t>El sistema permite ue el administrador pueda editar un evento ya creado</a:t>
+                        <a:t>El sistema permite </a:t>
+                      </a:r>
+                      <a:r>
+                        <a:rPr lang="es-CO" sz="1100">
+                          <a:latin typeface="Calibri"/>
+                          <a:ea typeface="Calibri"/>
+                          <a:cs typeface="Calibri"/>
+                          <a:sym typeface="Calibri"/>
+                        </a:rPr>
+                        <a:t>que</a:t>
+                      </a:r>
+                      <a:r>
+                        <a:rPr lang="es-CO" sz="1100">
+                          <a:latin typeface="Calibri"/>
+                          <a:ea typeface="Calibri"/>
+                          <a:cs typeface="Calibri"/>
+                          <a:sym typeface="Calibri"/>
+                        </a:rPr>
+                        <a:t> el administrador pueda editar un evento ya creado</a:t>
                       </a:r>
                       <a:endParaRPr sz="1100">
                         <a:latin typeface="Calibri"/>
@@ -19368,7 +19440,25 @@
                           <a:cs typeface="Calibri"/>
                           <a:sym typeface="Calibri"/>
                         </a:rPr>
-                        <a:t>El administrador esta editando un evento ya creado</a:t>
+                        <a:t>El administrador </a:t>
+                      </a:r>
+                      <a:r>
+                        <a:rPr lang="es-CO" sz="1100">
+                          <a:latin typeface="Calibri"/>
+                          <a:ea typeface="Calibri"/>
+                          <a:cs typeface="Calibri"/>
+                          <a:sym typeface="Calibri"/>
+                        </a:rPr>
+                        <a:t>está</a:t>
+                      </a:r>
+                      <a:r>
+                        <a:rPr lang="es-CO" sz="1100">
+                          <a:latin typeface="Calibri"/>
+                          <a:ea typeface="Calibri"/>
+                          <a:cs typeface="Calibri"/>
+                          <a:sym typeface="Calibri"/>
+                        </a:rPr>
+                        <a:t> editando un evento ya creado</a:t>
                       </a:r>
                       <a:endParaRPr sz="1100">
                         <a:latin typeface="Calibri"/>
@@ -19444,7 +19534,25 @@
                           <a:cs typeface="Calibri"/>
                           <a:sym typeface="Calibri"/>
                         </a:rPr>
-                        <a:t>El administrador esta editando un evento ya creado</a:t>
+                        <a:t>El administrador </a:t>
+                      </a:r>
+                      <a:r>
+                        <a:rPr lang="es-CO" sz="1100">
+                          <a:latin typeface="Calibri"/>
+                          <a:ea typeface="Calibri"/>
+                          <a:cs typeface="Calibri"/>
+                          <a:sym typeface="Calibri"/>
+                        </a:rPr>
+                        <a:t>está</a:t>
+                      </a:r>
+                      <a:r>
+                        <a:rPr lang="es-CO" sz="1100">
+                          <a:latin typeface="Calibri"/>
+                          <a:ea typeface="Calibri"/>
+                          <a:cs typeface="Calibri"/>
+                          <a:sym typeface="Calibri"/>
+                        </a:rPr>
+                        <a:t> editando un evento ya creado</a:t>
                       </a:r>
                       <a:endParaRPr sz="1100">
                         <a:latin typeface="Calibri"/>
@@ -19703,7 +19811,7 @@
             <a:tbl>
               <a:tblPr>
                 <a:noFill/>
-                <a:tableStyleId>{1136963C-93FD-44CD-9440-D0677881BE74}</a:tableStyleId>
+                <a:tableStyleId>{D753DD68-7685-4FA7-8D74-CE718F00DFCE}</a:tableStyleId>
               </a:tblPr>
               <a:tblGrid>
                 <a:gridCol w="952500"/>
@@ -21514,7 +21622,7 @@
             <a:tbl>
               <a:tblPr>
                 <a:noFill/>
-                <a:tableStyleId>{1136963C-93FD-44CD-9440-D0677881BE74}</a:tableStyleId>
+                <a:tableStyleId>{D753DD68-7685-4FA7-8D74-CE718F00DFCE}</a:tableStyleId>
               </a:tblPr>
               <a:tblGrid>
                 <a:gridCol w="1078825"/>
@@ -23134,7 +23242,25 @@
                           <a:cs typeface="Calibri"/>
                           <a:sym typeface="Calibri"/>
                         </a:rPr>
-                        <a:t>El sistema notifica que el usuario fue incrito exitosamente</a:t>
+                        <a:t>El sistema notifica que el usuario fue </a:t>
+                      </a:r>
+                      <a:r>
+                        <a:rPr lang="es-CO" sz="1100">
+                          <a:latin typeface="Calibri"/>
+                          <a:ea typeface="Calibri"/>
+                          <a:cs typeface="Calibri"/>
+                          <a:sym typeface="Calibri"/>
+                        </a:rPr>
+                        <a:t>inscrito</a:t>
+                      </a:r>
+                      <a:r>
+                        <a:rPr lang="es-CO" sz="1100">
+                          <a:latin typeface="Calibri"/>
+                          <a:ea typeface="Calibri"/>
+                          <a:cs typeface="Calibri"/>
+                          <a:sym typeface="Calibri"/>
+                        </a:rPr>
+                        <a:t> exitosamente</a:t>
                       </a:r>
                       <a:endParaRPr sz="1100">
                         <a:latin typeface="Calibri"/>
@@ -25419,7 +25545,7 @@
                   <a:cs typeface="Roboto"/>
                   <a:sym typeface="Roboto"/>
                 </a:rPr>
-                <a:t> añadir etiquetas para tener un orden.</a:t>
+                <a:t> añadir categorías para tener un orden.</a:t>
               </a:r>
               <a:endParaRPr sz="2200">
                 <a:solidFill>

</xml_diff>